<commit_message>
fixed capacity of parking spots
</commit_message>
<xml_diff>
--- a/SOHBigEventBox/docs/milestones_presentation.pptx
+++ b/SOHBigEventBox/docs/milestones_presentation.pptx
@@ -266,7 +266,7 @@
           <a:p>
             <a:fld id="{D634C42C-0A21-D44F-AA66-6D2EB08C0493}" type="datetimeFigureOut">
               <a:rPr lang="de-DE" smtClean="0"/>
-              <a:t>03.11.2024</a:t>
+              <a:t>04.11.24</a:t>
             </a:fld>
             <a:endParaRPr lang="de-DE"/>
           </a:p>
@@ -464,7 +464,7 @@
           <a:p>
             <a:fld id="{D634C42C-0A21-D44F-AA66-6D2EB08C0493}" type="datetimeFigureOut">
               <a:rPr lang="de-DE" smtClean="0"/>
-              <a:t>03.11.2024</a:t>
+              <a:t>04.11.24</a:t>
             </a:fld>
             <a:endParaRPr lang="de-DE"/>
           </a:p>
@@ -672,7 +672,7 @@
           <a:p>
             <a:fld id="{D634C42C-0A21-D44F-AA66-6D2EB08C0493}" type="datetimeFigureOut">
               <a:rPr lang="de-DE" smtClean="0"/>
-              <a:t>03.11.2024</a:t>
+              <a:t>04.11.24</a:t>
             </a:fld>
             <a:endParaRPr lang="de-DE"/>
           </a:p>
@@ -870,7 +870,7 @@
           <a:p>
             <a:fld id="{D634C42C-0A21-D44F-AA66-6D2EB08C0493}" type="datetimeFigureOut">
               <a:rPr lang="de-DE" smtClean="0"/>
-              <a:t>03.11.2024</a:t>
+              <a:t>04.11.24</a:t>
             </a:fld>
             <a:endParaRPr lang="de-DE"/>
           </a:p>
@@ -1145,7 +1145,7 @@
           <a:p>
             <a:fld id="{D634C42C-0A21-D44F-AA66-6D2EB08C0493}" type="datetimeFigureOut">
               <a:rPr lang="de-DE" smtClean="0"/>
-              <a:t>03.11.2024</a:t>
+              <a:t>04.11.24</a:t>
             </a:fld>
             <a:endParaRPr lang="de-DE"/>
           </a:p>
@@ -1410,7 +1410,7 @@
           <a:p>
             <a:fld id="{D634C42C-0A21-D44F-AA66-6D2EB08C0493}" type="datetimeFigureOut">
               <a:rPr lang="de-DE" smtClean="0"/>
-              <a:t>03.11.2024</a:t>
+              <a:t>04.11.24</a:t>
             </a:fld>
             <a:endParaRPr lang="de-DE"/>
           </a:p>
@@ -1822,7 +1822,7 @@
           <a:p>
             <a:fld id="{D634C42C-0A21-D44F-AA66-6D2EB08C0493}" type="datetimeFigureOut">
               <a:rPr lang="de-DE" smtClean="0"/>
-              <a:t>03.11.2024</a:t>
+              <a:t>04.11.24</a:t>
             </a:fld>
             <a:endParaRPr lang="de-DE"/>
           </a:p>
@@ -1963,7 +1963,7 @@
           <a:p>
             <a:fld id="{D634C42C-0A21-D44F-AA66-6D2EB08C0493}" type="datetimeFigureOut">
               <a:rPr lang="de-DE" smtClean="0"/>
-              <a:t>03.11.2024</a:t>
+              <a:t>04.11.24</a:t>
             </a:fld>
             <a:endParaRPr lang="de-DE"/>
           </a:p>
@@ -2076,7 +2076,7 @@
           <a:p>
             <a:fld id="{D634C42C-0A21-D44F-AA66-6D2EB08C0493}" type="datetimeFigureOut">
               <a:rPr lang="de-DE" smtClean="0"/>
-              <a:t>03.11.2024</a:t>
+              <a:t>04.11.24</a:t>
             </a:fld>
             <a:endParaRPr lang="de-DE"/>
           </a:p>
@@ -2387,7 +2387,7 @@
           <a:p>
             <a:fld id="{D634C42C-0A21-D44F-AA66-6D2EB08C0493}" type="datetimeFigureOut">
               <a:rPr lang="de-DE" smtClean="0"/>
-              <a:t>03.11.2024</a:t>
+              <a:t>04.11.24</a:t>
             </a:fld>
             <a:endParaRPr lang="de-DE"/>
           </a:p>
@@ -2675,7 +2675,7 @@
           <a:p>
             <a:fld id="{D634C42C-0A21-D44F-AA66-6D2EB08C0493}" type="datetimeFigureOut">
               <a:rPr lang="de-DE" smtClean="0"/>
-              <a:t>03.11.2024</a:t>
+              <a:t>04.11.24</a:t>
             </a:fld>
             <a:endParaRPr lang="de-DE"/>
           </a:p>
@@ -2916,7 +2916,7 @@
           <a:p>
             <a:fld id="{D634C42C-0A21-D44F-AA66-6D2EB08C0493}" type="datetimeFigureOut">
               <a:rPr lang="de-DE" smtClean="0"/>
-              <a:t>03.11.2024</a:t>
+              <a:t>04.11.24</a:t>
             </a:fld>
             <a:endParaRPr lang="de-DE"/>
           </a:p>
@@ -3842,14 +3842,14 @@
             <a:pPr lvl="1"/>
             <a:r>
               <a:rPr lang="de-DE" dirty="0"/>
-              <a:t>BLAU: 275 Fahrzeuge &amp; teilt sich mit GRAU 2 Ausfahrten</a:t>
+              <a:t>BLAU: 200 Fahrzeuge &amp; teilt sich mit GRAU 2 Ausfahrten</a:t>
             </a:r>
           </a:p>
           <a:p>
             <a:pPr lvl="1"/>
             <a:r>
               <a:rPr lang="de-DE" dirty="0"/>
-              <a:t>ROT: 1.400 Fahrzeuge &amp; ca. 2 Ausfahrten </a:t>
+              <a:t>ROT: 1.900 Fahrzeuge &amp; ca. 2 Ausfahrten </a:t>
             </a:r>
           </a:p>
           <a:p>
@@ -3877,7 +3877,7 @@
             </a:r>
             <a:r>
               <a:rPr lang="de-DE" b="1" dirty="0"/>
-              <a:t>ca. 3.235 Parkplätze</a:t>
+              <a:t>ca. 3.660 Parkplätze</a:t>
             </a:r>
           </a:p>
           <a:p>
@@ -4042,7 +4042,7 @@
             </a:r>
             <a:r>
               <a:rPr lang="de-DE" dirty="0"/>
-              <a:t>: 3.235 Autos</a:t>
+              <a:t>: 3.660 Autos</a:t>
             </a:r>
           </a:p>
           <a:p>
@@ -4063,11 +4063,11 @@
             <a:pPr lvl="1"/>
             <a:r>
               <a:rPr lang="de-DE" dirty="0"/>
-              <a:t>Gesamt: 3.235 Autos ÷ 2,5 Autos pro Minute ÷ 5 Parkplätze ÷ 5 nutzbare Ausfahrten ÷ Puffer 1,5 ≈ </a:t>
+              <a:t>Gesamt: 3.660 Autos ÷ 2,5 Autos pro Minute ÷ 5 Parkplätze ÷ 5 nutzbare Ausfahrten ÷ Puffer 1,5 ≈ </a:t>
             </a:r>
             <a:r>
               <a:rPr lang="de-DE" b="1" dirty="0"/>
-              <a:t>34,5 Minuten Wartezeit</a:t>
+              <a:t>39 Minuten Wartezeit</a:t>
             </a:r>
           </a:p>
           <a:p>

</xml_diff>